<commit_message>
final session 1 slides
</commit_message>
<xml_diff>
--- a/presentations/session_1/Components of a Data Center [Autosaved].pptx
+++ b/presentations/session_1/Components of a Data Center [Autosaved].pptx
@@ -284,7 +284,7 @@
           <a:p>
             <a:fld id="{4B04329C-8883-4FAC-A93E-C3F36DF5B3DE}" type="datetimeFigureOut">
               <a:rPr lang="en-US" smtClean="0"/>
-              <a:t>2/2/2018</a:t>
+              <a:t>2/5/2018</a:t>
             </a:fld>
             <a:endParaRPr lang="en-US"/>
           </a:p>
@@ -482,7 +482,7 @@
           <a:p>
             <a:fld id="{4B04329C-8883-4FAC-A93E-C3F36DF5B3DE}" type="datetimeFigureOut">
               <a:rPr lang="en-US" smtClean="0"/>
-              <a:t>2/2/2018</a:t>
+              <a:t>2/5/2018</a:t>
             </a:fld>
             <a:endParaRPr lang="en-US"/>
           </a:p>
@@ -690,7 +690,7 @@
           <a:p>
             <a:fld id="{4B04329C-8883-4FAC-A93E-C3F36DF5B3DE}" type="datetimeFigureOut">
               <a:rPr lang="en-US" smtClean="0"/>
-              <a:t>2/2/2018</a:t>
+              <a:t>2/5/2018</a:t>
             </a:fld>
             <a:endParaRPr lang="en-US"/>
           </a:p>
@@ -888,7 +888,7 @@
           <a:p>
             <a:fld id="{4B04329C-8883-4FAC-A93E-C3F36DF5B3DE}" type="datetimeFigureOut">
               <a:rPr lang="en-US" smtClean="0"/>
-              <a:t>2/2/2018</a:t>
+              <a:t>2/5/2018</a:t>
             </a:fld>
             <a:endParaRPr lang="en-US"/>
           </a:p>
@@ -1163,7 +1163,7 @@
           <a:p>
             <a:fld id="{4B04329C-8883-4FAC-A93E-C3F36DF5B3DE}" type="datetimeFigureOut">
               <a:rPr lang="en-US" smtClean="0"/>
-              <a:t>2/2/2018</a:t>
+              <a:t>2/5/2018</a:t>
             </a:fld>
             <a:endParaRPr lang="en-US"/>
           </a:p>
@@ -1428,7 +1428,7 @@
           <a:p>
             <a:fld id="{4B04329C-8883-4FAC-A93E-C3F36DF5B3DE}" type="datetimeFigureOut">
               <a:rPr lang="en-US" smtClean="0"/>
-              <a:t>2/2/2018</a:t>
+              <a:t>2/5/2018</a:t>
             </a:fld>
             <a:endParaRPr lang="en-US"/>
           </a:p>
@@ -1840,7 +1840,7 @@
           <a:p>
             <a:fld id="{4B04329C-8883-4FAC-A93E-C3F36DF5B3DE}" type="datetimeFigureOut">
               <a:rPr lang="en-US" smtClean="0"/>
-              <a:t>2/2/2018</a:t>
+              <a:t>2/5/2018</a:t>
             </a:fld>
             <a:endParaRPr lang="en-US"/>
           </a:p>
@@ -1981,7 +1981,7 @@
           <a:p>
             <a:fld id="{4B04329C-8883-4FAC-A93E-C3F36DF5B3DE}" type="datetimeFigureOut">
               <a:rPr lang="en-US" smtClean="0"/>
-              <a:t>2/2/2018</a:t>
+              <a:t>2/5/2018</a:t>
             </a:fld>
             <a:endParaRPr lang="en-US"/>
           </a:p>
@@ -2094,7 +2094,7 @@
           <a:p>
             <a:fld id="{4B04329C-8883-4FAC-A93E-C3F36DF5B3DE}" type="datetimeFigureOut">
               <a:rPr lang="en-US" smtClean="0"/>
-              <a:t>2/2/2018</a:t>
+              <a:t>2/5/2018</a:t>
             </a:fld>
             <a:endParaRPr lang="en-US"/>
           </a:p>
@@ -2405,7 +2405,7 @@
           <a:p>
             <a:fld id="{4B04329C-8883-4FAC-A93E-C3F36DF5B3DE}" type="datetimeFigureOut">
               <a:rPr lang="en-US" smtClean="0"/>
-              <a:t>2/2/2018</a:t>
+              <a:t>2/5/2018</a:t>
             </a:fld>
             <a:endParaRPr lang="en-US"/>
           </a:p>
@@ -2693,7 +2693,7 @@
           <a:p>
             <a:fld id="{4B04329C-8883-4FAC-A93E-C3F36DF5B3DE}" type="datetimeFigureOut">
               <a:rPr lang="en-US" smtClean="0"/>
-              <a:t>2/2/2018</a:t>
+              <a:t>2/5/2018</a:t>
             </a:fld>
             <a:endParaRPr lang="en-US"/>
           </a:p>
@@ -2934,7 +2934,7 @@
           <a:p>
             <a:fld id="{4B04329C-8883-4FAC-A93E-C3F36DF5B3DE}" type="datetimeFigureOut">
               <a:rPr lang="en-US" smtClean="0"/>
-              <a:t>2/2/2018</a:t>
+              <a:t>2/5/2018</a:t>
             </a:fld>
             <a:endParaRPr lang="en-US"/>
           </a:p>
@@ -4259,6 +4259,92 @@
           </a:fontRef>
         </p:style>
       </p:cxnSp>
+      <p:cxnSp>
+        <p:nvCxnSpPr>
+          <p:cNvPr id="12" name="Straight Arrow Connector 11">
+            <a:extLst>
+              <a:ext uri="{FF2B5EF4-FFF2-40B4-BE49-F238E27FC236}">
+                <a16:creationId xmlns:a16="http://schemas.microsoft.com/office/drawing/2014/main" id="{A4D6AC42-B77E-49E8-82CA-896EA37C7895}"/>
+              </a:ext>
+            </a:extLst>
+          </p:cNvPr>
+          <p:cNvCxnSpPr/>
+          <p:nvPr/>
+        </p:nvCxnSpPr>
+        <p:spPr>
+          <a:xfrm>
+            <a:off x="947253" y="2060020"/>
+            <a:ext cx="932035" cy="618886"/>
+          </a:xfrm>
+          <a:prstGeom prst="straightConnector1">
+            <a:avLst/>
+          </a:prstGeom>
+          <a:ln>
+            <a:tailEnd type="triangle"/>
+          </a:ln>
+        </p:spPr>
+        <p:style>
+          <a:lnRef idx="1">
+            <a:schemeClr val="accent1"/>
+          </a:lnRef>
+          <a:fillRef idx="0">
+            <a:schemeClr val="accent1"/>
+          </a:fillRef>
+          <a:effectRef idx="0">
+            <a:schemeClr val="accent1"/>
+          </a:effectRef>
+          <a:fontRef idx="minor">
+            <a:schemeClr val="tx1"/>
+          </a:fontRef>
+        </p:style>
+      </p:cxnSp>
+      <p:sp>
+        <p:nvSpPr>
+          <p:cNvPr id="16" name="TextBox 15">
+            <a:extLst>
+              <a:ext uri="{FF2B5EF4-FFF2-40B4-BE49-F238E27FC236}">
+                <a16:creationId xmlns:a16="http://schemas.microsoft.com/office/drawing/2014/main" id="{4B3C78EA-A8AA-4268-BE2B-F4DEB4FA92A7}"/>
+              </a:ext>
+            </a:extLst>
+          </p:cNvPr>
+          <p:cNvSpPr txBox="1"/>
+          <p:nvPr/>
+        </p:nvSpPr>
+        <p:spPr>
+          <a:xfrm>
+            <a:off x="307882" y="1371615"/>
+            <a:ext cx="926087" cy="923330"/>
+          </a:xfrm>
+          <a:prstGeom prst="rect">
+            <a:avLst/>
+          </a:prstGeom>
+          <a:noFill/>
+        </p:spPr>
+        <p:txBody>
+          <a:bodyPr wrap="none" rtlCol="0">
+            <a:spAutoFit/>
+          </a:bodyPr>
+          <a:lstStyle/>
+          <a:p>
+            <a:r>
+              <a:rPr lang="en-US" dirty="0"/>
+              <a:t>Various</a:t>
+            </a:r>
+          </a:p>
+          <a:p>
+            <a:r>
+              <a:rPr lang="en-US" dirty="0"/>
+              <a:t>Event</a:t>
+            </a:r>
+          </a:p>
+          <a:p>
+            <a:r>
+              <a:rPr lang="en-US" dirty="0"/>
+              <a:t>streams</a:t>
+            </a:r>
+          </a:p>
+        </p:txBody>
+      </p:sp>
     </p:spTree>
     <p:extLst>
       <p:ext uri="{BB962C8B-B14F-4D97-AF65-F5344CB8AC3E}">

</xml_diff>